<commit_message>
new draft of poster
</commit_message>
<xml_diff>
--- a/a0draft.pptx
+++ b/a0draft.pptx
@@ -4643,11 +4643,11 @@
             <a:pPr algn="ctr"/>
             <a:r>
               <a:rPr lang="en-US" sz="4800" dirty="0" smtClean="0"/>
-              <a:t>Vinita Mehlawat</a:t>
-            </a:r>
-            <a:r>
-              <a:rPr lang="en-US" sz="4800" baseline="30000" dirty="0" smtClean="0"/>
-              <a:t>1</a:t>
+              <a:t>Vinita </a:t>
+            </a:r>
+            <a:r>
+              <a:rPr lang="en-US" sz="4800" dirty="0" err="1" smtClean="0"/>
+              <a:t>Lamba</a:t>
             </a:r>
             <a:r>
               <a:rPr lang="en-US" sz="4800" dirty="0" smtClean="0"/>
@@ -4695,7 +4695,19 @@
             </a:r>
             <a:r>
               <a:rPr lang="en-US" sz="4800" dirty="0" smtClean="0"/>
-              <a:t>, Gita Yadav</a:t>
+              <a:t>, </a:t>
+            </a:r>
+            <a:r>
+              <a:rPr lang="en-US" sz="4800" dirty="0" err="1" smtClean="0"/>
+              <a:t>Gitanjali</a:t>
+            </a:r>
+            <a:r>
+              <a:rPr lang="en-US" sz="4800" dirty="0" smtClean="0"/>
+              <a:t> </a:t>
+            </a:r>
+            <a:r>
+              <a:rPr lang="en-US" sz="4800" dirty="0" smtClean="0"/>
+              <a:t>Yadav</a:t>
             </a:r>
             <a:r>
               <a:rPr lang="en-US" sz="4800" baseline="30000" dirty="0" smtClean="0"/>
@@ -4718,7 +4730,15 @@
             </a:r>
             <a:r>
               <a:rPr lang="en-US" sz="3600" dirty="0" smtClean="0"/>
-              <a:t>National Institute of Plant Genome Research, Delhi, IN; </a:t>
+              <a:t>National Institute of Plant Genome Research, </a:t>
+            </a:r>
+            <a:r>
+              <a:rPr lang="en-US" sz="3600" dirty="0" smtClean="0"/>
+              <a:t>New Delhi</a:t>
+            </a:r>
+            <a:r>
+              <a:rPr lang="en-US" sz="3600" dirty="0" smtClean="0"/>
+              <a:t>, IN; </a:t>
             </a:r>
             <a:r>
               <a:rPr lang="en-US" sz="3600" baseline="30000" dirty="0" smtClean="0"/>
@@ -4833,9 +4853,9 @@
           <p:grpSpPr>
             <a:xfrm>
               <a:off x="16661299" y="9933983"/>
-              <a:ext cx="13308447" cy="8196523"/>
+              <a:ext cx="11791834" cy="8128224"/>
               <a:chOff x="16661299" y="9933983"/>
-              <a:chExt cx="13308447" cy="8196523"/>
+              <a:chExt cx="11791834" cy="8128224"/>
             </a:xfrm>
           </p:grpSpPr>
           <p:sp>
@@ -5208,36 +5228,6 @@
               </p:txBody>
             </p:sp>
           </p:grpSp>
-          <p:pic>
-            <p:nvPicPr>
-              <p:cNvPr id="114" name="Picture 113" descr="Screenshot 2019-07-22 at 11.43.20.png"/>
-              <p:cNvPicPr>
-                <a:picLocks noChangeAspect="1"/>
-              </p:cNvPicPr>
-              <p:nvPr/>
-            </p:nvPicPr>
-            <p:blipFill>
-              <a:blip r:embed="rId4">
-                <a:extLst>
-                  <a:ext uri="{28A0092B-C50C-407E-A947-70E740481C1C}">
-                    <a14:useLocalDpi xmlns:a14="http://schemas.microsoft.com/office/drawing/2010/main" val="0"/>
-                  </a:ext>
-                </a:extLst>
-              </a:blip>
-              <a:stretch>
-                <a:fillRect/>
-              </a:stretch>
-            </p:blipFill>
-            <p:spPr>
-              <a:xfrm>
-                <a:off x="29487402" y="17768790"/>
-                <a:ext cx="321563" cy="293417"/>
-              </a:xfrm>
-              <a:prstGeom prst="rect">
-                <a:avLst/>
-              </a:prstGeom>
-            </p:spPr>
-          </p:pic>
           <p:grpSp>
             <p:nvGrpSpPr>
               <p:cNvPr id="115" name="Group 114"/>
@@ -5574,10 +5564,10 @@
             </p:nvGrpSpPr>
             <p:grpSpPr>
               <a:xfrm>
-                <a:off x="18490427" y="15577501"/>
-                <a:ext cx="9364619" cy="2553005"/>
-                <a:chOff x="18490427" y="15577501"/>
-                <a:chExt cx="9364619" cy="2553005"/>
+                <a:off x="16757824" y="15577501"/>
+                <a:ext cx="11097222" cy="2484706"/>
+                <a:chOff x="16757824" y="15577501"/>
+                <a:chExt cx="11097222" cy="2484706"/>
               </a:xfrm>
             </p:grpSpPr>
             <p:grpSp>
@@ -5708,7 +5698,7 @@
               </p:blipFill>
               <p:spPr>
                 <a:xfrm>
-                  <a:off x="18490427" y="17659380"/>
+                  <a:off x="16757824" y="17591081"/>
                   <a:ext cx="839503" cy="471126"/>
                 </a:xfrm>
                 <a:prstGeom prst="rect">
@@ -5802,36 +5792,6 @@
               </a:p>
             </p:txBody>
           </p:sp>
-          <p:pic>
-            <p:nvPicPr>
-              <p:cNvPr id="125" name="Picture 124" descr="Screenshot 2019-07-22 at 11.43.20.png"/>
-              <p:cNvPicPr>
-                <a:picLocks noChangeAspect="1"/>
-              </p:cNvPicPr>
-              <p:nvPr/>
-            </p:nvPicPr>
-            <p:blipFill>
-              <a:blip r:embed="rId4">
-                <a:extLst>
-                  <a:ext uri="{28A0092B-C50C-407E-A947-70E740481C1C}">
-                    <a14:useLocalDpi xmlns:a14="http://schemas.microsoft.com/office/drawing/2010/main" val="0"/>
-                  </a:ext>
-                </a:extLst>
-              </a:blip>
-              <a:stretch>
-                <a:fillRect/>
-              </a:stretch>
-            </p:blipFill>
-            <p:spPr>
-              <a:xfrm>
-                <a:off x="29648183" y="11898774"/>
-                <a:ext cx="321563" cy="293417"/>
-              </a:xfrm>
-              <a:prstGeom prst="rect">
-                <a:avLst/>
-              </a:prstGeom>
-            </p:spPr>
-          </p:pic>
           <p:pic>
             <p:nvPicPr>
               <p:cNvPr id="126" name="Picture 125" descr="Screenshot 2019-07-22 at 11.43.20.png"/>
@@ -6223,7 +6183,7 @@
             </p:blipFill>
             <p:spPr>
               <a:xfrm>
-                <a:off x="18910179" y="16763675"/>
+                <a:off x="16757824" y="16532842"/>
                 <a:ext cx="814791" cy="957715"/>
               </a:xfrm>
               <a:prstGeom prst="rect">
@@ -6723,11 +6683,11 @@
             </a:r>
             <a:r>
               <a:rPr lang="en-US" sz="4400" dirty="0" smtClean="0"/>
-              <a:t> 2.0 and </a:t>
+              <a:t> </a:t>
             </a:r>
             <a:r>
               <a:rPr lang="en-US" sz="4400" dirty="0" smtClean="0"/>
-              <a:t>WikiFactMine </a:t>
+              <a:t>2.0/WikiFactMine </a:t>
             </a:r>
             <a:r>
               <a:rPr lang="en-US" sz="4400" dirty="0" smtClean="0"/>
@@ -6898,38 +6858,8 @@
         </p:blipFill>
         <p:spPr>
           <a:xfrm>
-            <a:off x="611657" y="27818352"/>
+            <a:off x="748127" y="24170294"/>
             <a:ext cx="1667510" cy="1633220"/>
-          </a:xfrm>
-          <a:prstGeom prst="ellipse">
-            <a:avLst/>
-          </a:prstGeom>
-          <a:ln>
-            <a:solidFill>
-              <a:schemeClr val="tx1"/>
-            </a:solidFill>
-          </a:ln>
-        </p:spPr>
-      </p:pic>
-      <p:pic>
-        <p:nvPicPr>
-          <p:cNvPr id="152" name="Picture 151"/>
-          <p:cNvPicPr>
-            <a:picLocks noChangeAspect="1"/>
-          </p:cNvPicPr>
-          <p:nvPr/>
-        </p:nvPicPr>
-        <p:blipFill rotWithShape="1">
-          <a:blip r:embed="rId7"/>
-          <a:srcRect l="35268" t="33972" r="15810" b="4384"/>
-          <a:stretch>
-            <a:fillRect/>
-          </a:stretch>
-        </p:blipFill>
-        <p:spPr>
-          <a:xfrm>
-            <a:off x="611657" y="21777727"/>
-            <a:ext cx="2147145" cy="2026518"/>
           </a:xfrm>
           <a:prstGeom prst="ellipse">
             <a:avLst/>
@@ -6950,14 +6880,14 @@
           <p:nvPr/>
         </p:nvPicPr>
         <p:blipFill>
-          <a:blip r:embed="rId8"/>
+          <a:blip r:embed="rId7"/>
           <a:stretch>
             <a:fillRect/>
           </a:stretch>
         </p:blipFill>
         <p:spPr>
           <a:xfrm>
-            <a:off x="564378" y="24574081"/>
+            <a:off x="611657" y="21977301"/>
             <a:ext cx="2051685" cy="1878965"/>
           </a:xfrm>
           <a:prstGeom prst="ellipse">
@@ -6995,8 +6925,37 @@
             <a:pPr algn="ctr"/>
             <a:r>
               <a:rPr lang="en-US" sz="3000" dirty="0"/>
-              <a:t>Most commonly used  parts of Lantana</a:t>
-            </a:r>
+              <a:t>C</a:t>
+            </a:r>
+            <a:r>
+              <a:rPr lang="en-US" sz="3000" dirty="0" smtClean="0"/>
+              <a:t>ommonly </a:t>
+            </a:r>
+            <a:r>
+              <a:rPr lang="en-US" sz="3000" dirty="0"/>
+              <a:t>used  </a:t>
+            </a:r>
+            <a:r>
+              <a:rPr lang="en-US" sz="3000" b="1" dirty="0" err="1" smtClean="0"/>
+              <a:t>plantpart</a:t>
+            </a:r>
+            <a:r>
+              <a:rPr lang="en-US" sz="3000" dirty="0" err="1" smtClean="0"/>
+              <a:t>s</a:t>
+            </a:r>
+            <a:r>
+              <a:rPr lang="en-US" sz="3000" dirty="0" smtClean="0"/>
+              <a:t> </a:t>
+            </a:r>
+            <a:r>
+              <a:rPr lang="en-US" sz="3000" dirty="0"/>
+              <a:t>of </a:t>
+            </a:r>
+            <a:r>
+              <a:rPr lang="en-US" sz="3000" dirty="0" smtClean="0"/>
+              <a:t>Lantana </a:t>
+            </a:r>
+            <a:endParaRPr lang="en-US" sz="3000" dirty="0"/>
           </a:p>
         </p:txBody>
       </p:sp>
@@ -7009,7 +6968,7 @@
           <p:nvPr/>
         </p:nvPicPr>
         <p:blipFill>
-          <a:blip r:embed="rId9"/>
+          <a:blip r:embed="rId8"/>
           <a:srcRect r="17990" b="4930"/>
           <a:stretch>
             <a:fillRect/>
@@ -7036,34 +6995,6 @@
               </a:schemeClr>
             </a:glow>
           </a:effectLst>
-        </p:spPr>
-      </p:pic>
-      <p:pic>
-        <p:nvPicPr>
-          <p:cNvPr id="160" name="Picture 9"/>
-          <p:cNvPicPr>
-            <a:picLocks noChangeAspect="1"/>
-          </p:cNvPicPr>
-          <p:nvPr/>
-        </p:nvPicPr>
-        <p:blipFill>
-          <a:blip r:embed="rId10"/>
-          <a:stretch>
-            <a:fillRect/>
-          </a:stretch>
-        </p:blipFill>
-        <p:spPr>
-          <a:xfrm>
-            <a:off x="26509588" y="19172260"/>
-            <a:ext cx="2511003" cy="2755957"/>
-          </a:xfrm>
-          <a:prstGeom prst="rect">
-            <a:avLst/>
-          </a:prstGeom>
-          <a:noFill/>
-          <a:ln w="9525">
-            <a:noFill/>
-          </a:ln>
         </p:spPr>
       </p:pic>
       <p:sp>
@@ -7181,7 +7112,7 @@
             <p:nvPr/>
           </p:nvPicPr>
           <p:blipFill>
-            <a:blip r:embed="rId11"/>
+            <a:blip r:embed="rId9"/>
             <a:srcRect l="631" t="-409" r="675" b="4410"/>
             <a:stretch>
               <a:fillRect/>
@@ -7646,7 +7577,7 @@
           </p:nvSpPr>
           <p:spPr>
             <a:xfrm rot="14340000">
-              <a:off x="6387842" y="23802638"/>
+              <a:off x="6643694" y="23621915"/>
               <a:ext cx="655566" cy="1752755"/>
             </a:xfrm>
             <a:prstGeom prst="rect">
@@ -7692,7 +7623,7 @@
           </p:nvSpPr>
           <p:spPr>
             <a:xfrm rot="20220000">
-              <a:off x="5784474" y="23378723"/>
+              <a:off x="5784474" y="23688533"/>
               <a:ext cx="1108617" cy="889698"/>
             </a:xfrm>
             <a:prstGeom prst="rect">
@@ -7707,7 +7638,7 @@
             <a:lstStyle/>
             <a:p>
               <a:r>
-                <a:rPr lang="en-US" sz="1600" b="1">
+                <a:rPr lang="en-US" sz="1600" b="1" dirty="0">
                   <a:latin typeface="Shruti" charset="0"/>
                   <a:cs typeface="Shruti" charset="0"/>
                 </a:rPr>
@@ -7724,8 +7655,8 @@
           </p:nvSpPr>
           <p:spPr>
             <a:xfrm rot="21060000">
-              <a:off x="5528133" y="22742597"/>
-              <a:ext cx="1621298" cy="515088"/>
+              <a:off x="5528133" y="22845868"/>
+              <a:ext cx="1621299" cy="515088"/>
             </a:xfrm>
             <a:prstGeom prst="rect">
               <a:avLst/>
@@ -7756,8 +7687,8 @@
           </p:nvSpPr>
           <p:spPr>
             <a:xfrm rot="840000">
-              <a:off x="5102725" y="21838001"/>
-              <a:ext cx="2471749" cy="889698"/>
+              <a:off x="5102725" y="22070358"/>
+              <a:ext cx="2471750" cy="889698"/>
             </a:xfrm>
             <a:prstGeom prst="rect">
               <a:avLst/>
@@ -7771,12 +7702,23 @@
             <a:lstStyle/>
             <a:p>
               <a:r>
-                <a:rPr lang="en-US" sz="1600" b="1">
+                <a:rPr lang="en-US" sz="1600" b="1" dirty="0">
                   <a:latin typeface="Shruti" charset="0"/>
                   <a:cs typeface="Shruti" charset="0"/>
                 </a:rPr>
-                <a:t>α-phellandrene</a:t>
+                <a:t>α-</a:t>
               </a:r>
+              <a:r>
+                <a:rPr lang="en-US" sz="1600" b="1" dirty="0" err="1">
+                  <a:latin typeface="Shruti" charset="0"/>
+                  <a:cs typeface="Shruti" charset="0"/>
+                </a:rPr>
+                <a:t>phellandrene</a:t>
+              </a:r>
+              <a:endParaRPr lang="en-US" sz="1600" b="1" dirty="0">
+                <a:latin typeface="Shruti" charset="0"/>
+                <a:cs typeface="Shruti" charset="0"/>
+              </a:endParaRPr>
             </a:p>
           </p:txBody>
         </p:sp>
@@ -7788,8 +7730,8 @@
           </p:nvSpPr>
           <p:spPr>
             <a:xfrm rot="1860000">
-              <a:off x="5849106" y="20919380"/>
-              <a:ext cx="1549362" cy="889698"/>
+              <a:off x="5849106" y="21177555"/>
+              <a:ext cx="1549363" cy="889698"/>
             </a:xfrm>
             <a:prstGeom prst="rect">
               <a:avLst/>
@@ -7803,7 +7745,7 @@
             <a:lstStyle/>
             <a:p>
               <a:r>
-                <a:rPr lang="en-US" sz="1600" b="1">
+                <a:rPr lang="en-US" sz="1600" b="1" dirty="0">
                   <a:latin typeface="Shruti" charset="0"/>
                   <a:cs typeface="Shruti" charset="0"/>
                 </a:rPr>
@@ -7905,7 +7847,7 @@
         </p:nvSpPr>
         <p:spPr>
           <a:xfrm>
-            <a:off x="3915248" y="19172260"/>
+            <a:off x="3915248" y="18958539"/>
             <a:ext cx="22532068" cy="1354217"/>
           </a:xfrm>
           <a:prstGeom prst="rect">
@@ -7940,32 +7882,6 @@
           </a:p>
         </p:txBody>
       </p:sp>
-      <p:sp>
-        <p:nvSpPr>
-          <p:cNvPr id="11" name="TextBox 10"/>
-          <p:cNvSpPr txBox="1"/>
-          <p:nvPr/>
-        </p:nvSpPr>
-        <p:spPr>
-          <a:xfrm>
-            <a:off x="26451691" y="23040940"/>
-            <a:ext cx="184666" cy="1354217"/>
-          </a:xfrm>
-          <a:prstGeom prst="rect">
-            <a:avLst/>
-          </a:prstGeom>
-          <a:noFill/>
-        </p:spPr>
-        <p:txBody>
-          <a:bodyPr wrap="none" rtlCol="0">
-            <a:spAutoFit/>
-          </a:bodyPr>
-          <a:lstStyle/>
-          <a:p>
-            <a:endParaRPr lang="en-US" dirty="0"/>
-          </a:p>
-        </p:txBody>
-      </p:sp>
       <p:pic>
         <p:nvPicPr>
           <p:cNvPr id="12" name="Picture 11" descr="Screenshot 2019-07-22 at 22.46.49.png"/>
@@ -7975,7 +7891,7 @@
           <p:nvPr/>
         </p:nvPicPr>
         <p:blipFill>
-          <a:blip r:embed="rId12">
+          <a:blip r:embed="rId10">
             <a:extLst>
               <a:ext uri="{28A0092B-C50C-407E-A947-70E740481C1C}">
                 <a14:useLocalDpi xmlns:a14="http://schemas.microsoft.com/office/drawing/2010/main" val="0"/>
@@ -8005,7 +7921,7 @@
           <p:nvPr/>
         </p:nvPicPr>
         <p:blipFill>
-          <a:blip r:embed="rId13">
+          <a:blip r:embed="rId11">
             <a:extLst>
               <a:ext uri="{28A0092B-C50C-407E-A947-70E740481C1C}">
                 <a14:useLocalDpi xmlns:a14="http://schemas.microsoft.com/office/drawing/2010/main" val="0"/>
@@ -8035,7 +7951,7 @@
           <p:nvPr/>
         </p:nvPicPr>
         <p:blipFill>
-          <a:blip r:embed="rId14">
+          <a:blip r:embed="rId12">
             <a:extLst>
               <a:ext uri="{28A0092B-C50C-407E-A947-70E740481C1C}">
                 <a14:useLocalDpi xmlns:a14="http://schemas.microsoft.com/office/drawing/2010/main" val="0"/>
@@ -8056,46 +7972,89 @@
           </a:prstGeom>
         </p:spPr>
       </p:pic>
-      <p:sp>
-        <p:nvSpPr>
-          <p:cNvPr id="208" name="TextBox 207"/>
-          <p:cNvSpPr txBox="1"/>
+      <p:grpSp>
+        <p:nvGrpSpPr>
+          <p:cNvPr id="36" name="Group 35"/>
+          <p:cNvGrpSpPr/>
           <p:nvPr/>
-        </p:nvSpPr>
-        <p:spPr>
+        </p:nvGrpSpPr>
+        <p:grpSpPr>
           <a:xfrm>
-            <a:off x="26810453" y="22163299"/>
-            <a:ext cx="1425526" cy="369332"/>
+            <a:off x="26850136" y="19948957"/>
+            <a:ext cx="2511003" cy="3360371"/>
+            <a:chOff x="26509588" y="19172260"/>
+            <a:chExt cx="2511003" cy="3360371"/>
           </a:xfrm>
-          <a:prstGeom prst="rect">
-            <a:avLst/>
-          </a:prstGeom>
-          <a:solidFill>
-            <a:schemeClr val="accent6">
-              <a:lumMod val="20000"/>
-              <a:lumOff val="80000"/>
-            </a:schemeClr>
-          </a:solidFill>
-          <a:ln>
+        </p:grpSpPr>
+        <p:pic>
+          <p:nvPicPr>
+            <p:cNvPr id="160" name="Picture 9"/>
+            <p:cNvPicPr>
+              <a:picLocks noChangeAspect="1"/>
+            </p:cNvPicPr>
+            <p:nvPr/>
+          </p:nvPicPr>
+          <p:blipFill>
+            <a:blip r:embed="rId13"/>
+            <a:stretch>
+              <a:fillRect/>
+            </a:stretch>
+          </p:blipFill>
+          <p:spPr>
+            <a:xfrm>
+              <a:off x="26509588" y="19172260"/>
+              <a:ext cx="2511003" cy="2755957"/>
+            </a:xfrm>
+            <a:prstGeom prst="rect">
+              <a:avLst/>
+            </a:prstGeom>
+            <a:noFill/>
+            <a:ln w="9525">
+              <a:noFill/>
+            </a:ln>
+          </p:spPr>
+        </p:pic>
+        <p:sp>
+          <p:nvSpPr>
+            <p:cNvPr id="208" name="TextBox 207"/>
+            <p:cNvSpPr txBox="1"/>
+            <p:nvPr/>
+          </p:nvSpPr>
+          <p:spPr>
+            <a:xfrm>
+              <a:off x="26810453" y="22163299"/>
+              <a:ext cx="1425526" cy="369332"/>
+            </a:xfrm>
+            <a:prstGeom prst="rect">
+              <a:avLst/>
+            </a:prstGeom>
             <a:solidFill>
-              <a:schemeClr val="tx1"/>
+              <a:schemeClr val="accent6">
+                <a:lumMod val="20000"/>
+                <a:lumOff val="80000"/>
+              </a:schemeClr>
             </a:solidFill>
-          </a:ln>
-        </p:spPr>
-        <p:txBody>
-          <a:bodyPr wrap="square" rtlCol="0">
-            <a:spAutoFit/>
-          </a:bodyPr>
-          <a:lstStyle/>
-          <a:p>
-            <a:r>
-              <a:rPr lang="en-US" sz="1800" b="1" dirty="0" smtClean="0"/>
-              <a:t>extraction </a:t>
-            </a:r>
-            <a:endParaRPr lang="en-US" sz="1800" b="1" dirty="0"/>
-          </a:p>
-        </p:txBody>
-      </p:sp>
+            <a:ln>
+              <a:solidFill>
+                <a:schemeClr val="tx1"/>
+              </a:solidFill>
+            </a:ln>
+          </p:spPr>
+          <p:txBody>
+            <a:bodyPr wrap="square" rtlCol="0">
+              <a:spAutoFit/>
+            </a:bodyPr>
+            <a:lstStyle/>
+            <a:p>
+              <a:r>
+                <a:rPr lang="en-US" sz="1800" b="1" dirty="0" smtClean="0"/>
+                <a:t>extraction </a:t>
+              </a:r>
+              <a:endParaRPr lang="en-US" sz="1800" b="1" dirty="0"/>
+            </a:p>
+          </p:txBody>
+        </p:sp>
+      </p:grpSp>
       <p:sp>
         <p:nvSpPr>
           <p:cNvPr id="209" name="Text Box 29"/>
@@ -8146,7 +8105,7 @@
           <p:nvPr/>
         </p:nvPicPr>
         <p:blipFill>
-          <a:blip r:embed="rId15"/>
+          <a:blip r:embed="rId14"/>
           <a:stretch>
             <a:fillRect/>
           </a:stretch>
@@ -8278,7 +8237,7 @@
           <p:nvPr/>
         </p:nvPicPr>
         <p:blipFill>
-          <a:blip r:embed="rId16"/>
+          <a:blip r:embed="rId15"/>
           <a:srcRect l="51884" t="27831" r="17282" b="1047"/>
           <a:stretch>
             <a:fillRect/>
@@ -8394,7 +8353,7 @@
           <p:nvPr/>
         </p:nvPicPr>
         <p:blipFill>
-          <a:blip r:embed="rId15"/>
+          <a:blip r:embed="rId14"/>
           <a:stretch>
             <a:fillRect/>
           </a:stretch>
@@ -8526,7 +8485,7 @@
           <p:nvPr/>
         </p:nvPicPr>
         <p:blipFill>
-          <a:blip r:embed="rId16"/>
+          <a:blip r:embed="rId15"/>
           <a:srcRect l="51884" t="27831" r="17282" b="1047"/>
           <a:stretch>
             <a:fillRect/>
@@ -8601,7 +8560,7 @@
           <p:nvPr/>
         </p:nvPicPr>
         <p:blipFill>
-          <a:blip r:embed="rId16"/>
+          <a:blip r:embed="rId15"/>
           <a:srcRect l="51884" t="27831" r="17282" b="1047"/>
           <a:stretch>
             <a:fillRect/>
@@ -8609,8 +8568,8 @@
         </p:blipFill>
         <p:spPr>
           <a:xfrm>
-            <a:off x="8169071" y="23817858"/>
-            <a:ext cx="1833568" cy="3308590"/>
+            <a:off x="8588157" y="24574080"/>
+            <a:ext cx="1414481" cy="2552367"/>
           </a:xfrm>
           <a:prstGeom prst="rect">
             <a:avLst/>
@@ -8623,121 +8582,6 @@
           </a:ln>
         </p:spPr>
       </p:pic>
-      <p:sp>
-        <p:nvSpPr>
-          <p:cNvPr id="267" name="Text Box 36"/>
-          <p:cNvSpPr txBox="1"/>
-          <p:nvPr/>
-        </p:nvSpPr>
-        <p:spPr>
-          <a:xfrm>
-            <a:off x="11685371" y="7044481"/>
-            <a:ext cx="5337175" cy="645160"/>
-          </a:xfrm>
-          <a:prstGeom prst="rect">
-            <a:avLst/>
-          </a:prstGeom>
-          <a:noFill/>
-        </p:spPr>
-        <p:txBody>
-          <a:bodyPr wrap="square" rtlCol="0">
-            <a:spAutoFit/>
-          </a:bodyPr>
-          <a:lstStyle/>
-          <a:p>
-            <a:r>
-              <a:rPr lang="en-US" sz="3600" kern="1200"/>
-              <a:t>Lantana </a:t>
-            </a:r>
-            <a:r>
-              <a:rPr lang="en-US" sz="3600" kern="1200">
-                <a:latin typeface="Arial" panose="020B0604020202020204" pitchFamily="34" charset="0"/>
-                <a:cs typeface="Arial" panose="020B0604020202020204" pitchFamily="34" charset="0"/>
-              </a:rPr>
-              <a:t>Essential </a:t>
-            </a:r>
-            <a:r>
-              <a:rPr lang="en-US" sz="3600" kern="1200"/>
-              <a:t>Oil </a:t>
-            </a:r>
-            <a:r>
-              <a:rPr lang="en-US" sz="3600" kern="1200" baseline="30000"/>
-              <a:t>[4]</a:t>
-            </a:r>
-          </a:p>
-        </p:txBody>
-      </p:sp>
-      <p:pic>
-        <p:nvPicPr>
-          <p:cNvPr id="268" name="Picture 267"/>
-          <p:cNvPicPr>
-            <a:picLocks noChangeAspect="1"/>
-          </p:cNvPicPr>
-          <p:nvPr/>
-        </p:nvPicPr>
-        <p:blipFill>
-          <a:blip r:embed="rId15"/>
-          <a:stretch>
-            <a:fillRect/>
-          </a:stretch>
-        </p:blipFill>
-        <p:spPr>
-          <a:xfrm>
-            <a:off x="27446857" y="22925872"/>
-            <a:ext cx="2522889" cy="1860787"/>
-          </a:xfrm>
-          <a:prstGeom prst="rect">
-            <a:avLst/>
-          </a:prstGeom>
-          <a:noFill/>
-          <a:ln w="38100">
-            <a:solidFill>
-              <a:schemeClr val="tx1"/>
-            </a:solidFill>
-          </a:ln>
-        </p:spPr>
-      </p:pic>
-      <p:sp>
-        <p:nvSpPr>
-          <p:cNvPr id="269" name="Text Box 29"/>
-          <p:cNvSpPr txBox="1"/>
-          <p:nvPr/>
-        </p:nvSpPr>
-        <p:spPr>
-          <a:xfrm>
-            <a:off x="12259411" y="11243101"/>
-            <a:ext cx="6317615" cy="1198880"/>
-          </a:xfrm>
-          <a:prstGeom prst="rect">
-            <a:avLst/>
-          </a:prstGeom>
-          <a:noFill/>
-          <a:ln w="9525">
-            <a:noFill/>
-          </a:ln>
-        </p:spPr>
-        <p:txBody>
-          <a:bodyPr wrap="square" anchor="t">
-            <a:spAutoFit/>
-          </a:bodyPr>
-          <a:lstStyle/>
-          <a:p>
-            <a:pPr algn="ctr"/>
-            <a:r>
-              <a:rPr lang="en-IN" altLang="en-US" sz="3600" kern="1200" dirty="0" smtClean="0">
-                <a:latin typeface="Arial" panose="020B0604020202020204" pitchFamily="34" charset="0"/>
-              </a:rPr>
-              <a:t>GC/MS Instrument – Agilent Technologies </a:t>
-            </a:r>
-            <a:r>
-              <a:rPr lang="en-IN" altLang="en-US" sz="3600" kern="1200" baseline="30000" dirty="0" smtClean="0">
-                <a:latin typeface="Arial" panose="020B0604020202020204" pitchFamily="34" charset="0"/>
-              </a:rPr>
-              <a:t>[3]</a:t>
-            </a:r>
-          </a:p>
-        </p:txBody>
-      </p:sp>
       <p:sp>
         <p:nvSpPr>
           <p:cNvPr id="24" name="TextBox 23"/>
@@ -8770,86 +8614,157 @@
           </a:p>
         </p:txBody>
       </p:sp>
-      <p:sp>
-        <p:nvSpPr>
-          <p:cNvPr id="270" name="TextBox 269"/>
-          <p:cNvSpPr txBox="1"/>
+      <p:grpSp>
+        <p:nvGrpSpPr>
+          <p:cNvPr id="32" name="Group 31"/>
+          <p:cNvGrpSpPr/>
           <p:nvPr/>
-        </p:nvSpPr>
-        <p:spPr>
+        </p:nvGrpSpPr>
+        <p:grpSpPr>
           <a:xfrm>
-            <a:off x="27641223" y="25102821"/>
-            <a:ext cx="1582172" cy="369332"/>
+            <a:off x="26451691" y="23804245"/>
+            <a:ext cx="2757411" cy="3269315"/>
+            <a:chOff x="26451691" y="22925872"/>
+            <a:chExt cx="2757411" cy="3269315"/>
           </a:xfrm>
-          <a:prstGeom prst="rect">
-            <a:avLst/>
-          </a:prstGeom>
-          <a:solidFill>
-            <a:schemeClr val="accent6">
-              <a:lumMod val="20000"/>
-              <a:lumOff val="80000"/>
-            </a:schemeClr>
-          </a:solidFill>
-          <a:ln>
+        </p:grpSpPr>
+        <p:sp>
+          <p:nvSpPr>
+            <p:cNvPr id="11" name="TextBox 10"/>
+            <p:cNvSpPr txBox="1"/>
+            <p:nvPr/>
+          </p:nvSpPr>
+          <p:spPr>
+            <a:xfrm>
+              <a:off x="26451691" y="23040940"/>
+              <a:ext cx="184666" cy="1354217"/>
+            </a:xfrm>
+            <a:prstGeom prst="rect">
+              <a:avLst/>
+            </a:prstGeom>
+            <a:noFill/>
+          </p:spPr>
+          <p:txBody>
+            <a:bodyPr wrap="none" rtlCol="0">
+              <a:spAutoFit/>
+            </a:bodyPr>
+            <a:lstStyle/>
+            <a:p>
+              <a:endParaRPr lang="en-US" dirty="0"/>
+            </a:p>
+          </p:txBody>
+        </p:sp>
+        <p:pic>
+          <p:nvPicPr>
+            <p:cNvPr id="268" name="Picture 267"/>
+            <p:cNvPicPr>
+              <a:picLocks noChangeAspect="1"/>
+            </p:cNvPicPr>
+            <p:nvPr/>
+          </p:nvPicPr>
+          <p:blipFill>
+            <a:blip r:embed="rId14"/>
+            <a:stretch>
+              <a:fillRect/>
+            </a:stretch>
+          </p:blipFill>
+          <p:spPr>
+            <a:xfrm>
+              <a:off x="26686213" y="22925872"/>
+              <a:ext cx="2522889" cy="1860787"/>
+            </a:xfrm>
+            <a:prstGeom prst="rect">
+              <a:avLst/>
+            </a:prstGeom>
+            <a:noFill/>
+            <a:ln w="38100">
+              <a:solidFill>
+                <a:schemeClr val="tx1"/>
+              </a:solidFill>
+            </a:ln>
+          </p:spPr>
+        </p:pic>
+        <p:sp>
+          <p:nvSpPr>
+            <p:cNvPr id="270" name="TextBox 269"/>
+            <p:cNvSpPr txBox="1"/>
+            <p:nvPr/>
+          </p:nvSpPr>
+          <p:spPr>
+            <a:xfrm>
+              <a:off x="26939554" y="25176927"/>
+              <a:ext cx="1582172" cy="369332"/>
+            </a:xfrm>
+            <a:prstGeom prst="rect">
+              <a:avLst/>
+            </a:prstGeom>
             <a:solidFill>
-              <a:schemeClr val="tx1"/>
+              <a:schemeClr val="accent6">
+                <a:lumMod val="20000"/>
+                <a:lumOff val="80000"/>
+              </a:schemeClr>
             </a:solidFill>
-          </a:ln>
-        </p:spPr>
-        <p:txBody>
-          <a:bodyPr wrap="square" rtlCol="0">
-            <a:spAutoFit/>
-          </a:bodyPr>
-          <a:lstStyle/>
-          <a:p>
-            <a:r>
-              <a:rPr lang="en-US" sz="1800" b="1" dirty="0" smtClean="0"/>
-              <a:t>measurement</a:t>
-            </a:r>
-            <a:endParaRPr lang="en-US" sz="1800" b="1" dirty="0"/>
-          </a:p>
-        </p:txBody>
-      </p:sp>
-      <p:sp>
-        <p:nvSpPr>
-          <p:cNvPr id="271" name="TextBox 270"/>
-          <p:cNvSpPr txBox="1"/>
-          <p:nvPr/>
-        </p:nvSpPr>
-        <p:spPr>
-          <a:xfrm>
-            <a:off x="27656992" y="25751749"/>
-            <a:ext cx="1592281" cy="369332"/>
-          </a:xfrm>
-          <a:prstGeom prst="rect">
-            <a:avLst/>
-          </a:prstGeom>
-          <a:solidFill>
-            <a:schemeClr val="accent6">
-              <a:lumMod val="20000"/>
-              <a:lumOff val="80000"/>
-            </a:schemeClr>
-          </a:solidFill>
-          <a:ln>
+            <a:ln>
+              <a:solidFill>
+                <a:schemeClr val="tx1"/>
+              </a:solidFill>
+            </a:ln>
+          </p:spPr>
+          <p:txBody>
+            <a:bodyPr wrap="square" rtlCol="0">
+              <a:spAutoFit/>
+            </a:bodyPr>
+            <a:lstStyle/>
+            <a:p>
+              <a:r>
+                <a:rPr lang="en-US" sz="1800" b="1" dirty="0" smtClean="0"/>
+                <a:t>measurement</a:t>
+              </a:r>
+              <a:endParaRPr lang="en-US" sz="1800" b="1" dirty="0"/>
+            </a:p>
+          </p:txBody>
+        </p:sp>
+        <p:sp>
+          <p:nvSpPr>
+            <p:cNvPr id="271" name="TextBox 270"/>
+            <p:cNvSpPr txBox="1"/>
+            <p:nvPr/>
+          </p:nvSpPr>
+          <p:spPr>
+            <a:xfrm>
+              <a:off x="26955323" y="25825855"/>
+              <a:ext cx="1592281" cy="369332"/>
+            </a:xfrm>
+            <a:prstGeom prst="rect">
+              <a:avLst/>
+            </a:prstGeom>
             <a:solidFill>
-              <a:schemeClr val="tx1"/>
+              <a:schemeClr val="accent6">
+                <a:lumMod val="20000"/>
+                <a:lumOff val="80000"/>
+              </a:schemeClr>
             </a:solidFill>
-          </a:ln>
-        </p:spPr>
-        <p:txBody>
-          <a:bodyPr wrap="square" rtlCol="0">
-            <a:spAutoFit/>
-          </a:bodyPr>
-          <a:lstStyle/>
-          <a:p>
-            <a:r>
-              <a:rPr lang="en-US" sz="1800" b="1" dirty="0" smtClean="0"/>
-              <a:t>profile (????)</a:t>
-            </a:r>
-            <a:endParaRPr lang="en-US" sz="1800" b="1" dirty="0"/>
-          </a:p>
-        </p:txBody>
-      </p:sp>
+            <a:ln>
+              <a:solidFill>
+                <a:schemeClr val="tx1"/>
+              </a:solidFill>
+            </a:ln>
+          </p:spPr>
+          <p:txBody>
+            <a:bodyPr wrap="square" rtlCol="0">
+              <a:spAutoFit/>
+            </a:bodyPr>
+            <a:lstStyle/>
+            <a:p>
+              <a:r>
+                <a:rPr lang="en-US" sz="1800" b="1" dirty="0" smtClean="0"/>
+                <a:t>profile (????)</a:t>
+              </a:r>
+              <a:endParaRPr lang="en-US" sz="1800" b="1" dirty="0"/>
+            </a:p>
+          </p:txBody>
+        </p:sp>
+      </p:grpSp>
       <p:sp>
         <p:nvSpPr>
           <p:cNvPr id="272" name="TextBox 271"/>
@@ -8930,6 +8845,311 @@
           </a:p>
         </p:txBody>
       </p:sp>
+      <p:sp>
+        <p:nvSpPr>
+          <p:cNvPr id="25" name="TextBox 24"/>
+          <p:cNvSpPr txBox="1"/>
+          <p:nvPr/>
+        </p:nvSpPr>
+        <p:spPr>
+          <a:xfrm>
+            <a:off x="11465293" y="20274926"/>
+            <a:ext cx="3595080" cy="1354217"/>
+          </a:xfrm>
+          <a:prstGeom prst="rect">
+            <a:avLst/>
+          </a:prstGeom>
+          <a:noFill/>
+        </p:spPr>
+        <p:txBody>
+          <a:bodyPr wrap="none" rtlCol="0">
+            <a:spAutoFit/>
+          </a:bodyPr>
+          <a:lstStyle/>
+          <a:p>
+            <a:r>
+              <a:rPr lang="en-US" dirty="0" smtClean="0"/>
+              <a:t>Lantana </a:t>
+            </a:r>
+            <a:endParaRPr lang="en-US" dirty="0"/>
+          </a:p>
+        </p:txBody>
+      </p:sp>
+      <p:pic>
+        <p:nvPicPr>
+          <p:cNvPr id="274" name="Picture 273" descr="Screenshot 2019-07-22 at 11.43.20.png"/>
+          <p:cNvPicPr>
+            <a:picLocks noChangeAspect="1"/>
+          </p:cNvPicPr>
+          <p:nvPr/>
+        </p:nvPicPr>
+        <p:blipFill>
+          <a:blip r:embed="rId4">
+            <a:extLst>
+              <a:ext uri="{28A0092B-C50C-407E-A947-70E740481C1C}">
+                <a14:useLocalDpi xmlns:a14="http://schemas.microsoft.com/office/drawing/2010/main" val="0"/>
+              </a:ext>
+            </a:extLst>
+          </a:blip>
+          <a:stretch>
+            <a:fillRect/>
+          </a:stretch>
+        </p:blipFill>
+        <p:spPr>
+          <a:xfrm>
+            <a:off x="27917496" y="14245933"/>
+            <a:ext cx="321563" cy="293417"/>
+          </a:xfrm>
+          <a:prstGeom prst="rect">
+            <a:avLst/>
+          </a:prstGeom>
+        </p:spPr>
+      </p:pic>
+      <p:pic>
+        <p:nvPicPr>
+          <p:cNvPr id="275" name="Picture 274" descr="Screenshot 2019-07-22 at 11.43.20.png"/>
+          <p:cNvPicPr>
+            <a:picLocks noChangeAspect="1"/>
+          </p:cNvPicPr>
+          <p:nvPr/>
+        </p:nvPicPr>
+        <p:blipFill>
+          <a:blip r:embed="rId4">
+            <a:extLst>
+              <a:ext uri="{28A0092B-C50C-407E-A947-70E740481C1C}">
+                <a14:useLocalDpi xmlns:a14="http://schemas.microsoft.com/office/drawing/2010/main" val="0"/>
+              </a:ext>
+            </a:extLst>
+          </a:blip>
+          <a:stretch>
+            <a:fillRect/>
+          </a:stretch>
+        </p:blipFill>
+        <p:spPr>
+          <a:xfrm>
+            <a:off x="27348901" y="17189506"/>
+            <a:ext cx="321563" cy="293417"/>
+          </a:xfrm>
+          <a:prstGeom prst="rect">
+            <a:avLst/>
+          </a:prstGeom>
+        </p:spPr>
+      </p:pic>
+      <p:pic>
+        <p:nvPicPr>
+          <p:cNvPr id="39" name="Picture 38"/>
+          <p:cNvPicPr>
+            <a:picLocks noChangeAspect="1"/>
+          </p:cNvPicPr>
+          <p:nvPr/>
+        </p:nvPicPr>
+        <p:blipFill>
+          <a:blip r:embed="rId16"/>
+          <a:stretch>
+            <a:fillRect/>
+          </a:stretch>
+        </p:blipFill>
+        <p:spPr>
+          <a:xfrm>
+            <a:off x="8077229" y="21052784"/>
+            <a:ext cx="1309956" cy="1152718"/>
+          </a:xfrm>
+          <a:prstGeom prst="rect">
+            <a:avLst/>
+          </a:prstGeom>
+          <a:solidFill>
+            <a:srgbClr val="FFFFFF"/>
+          </a:solidFill>
+        </p:spPr>
+      </p:pic>
+      <p:pic>
+        <p:nvPicPr>
+          <p:cNvPr id="40" name="Picture 39"/>
+          <p:cNvPicPr>
+            <a:picLocks noChangeAspect="1"/>
+          </p:cNvPicPr>
+          <p:nvPr/>
+        </p:nvPicPr>
+        <p:blipFill>
+          <a:blip r:embed="rId17"/>
+          <a:stretch>
+            <a:fillRect/>
+          </a:stretch>
+        </p:blipFill>
+        <p:spPr>
+          <a:xfrm>
+            <a:off x="6263438" y="20274926"/>
+            <a:ext cx="1592964" cy="1800796"/>
+          </a:xfrm>
+          <a:prstGeom prst="rect">
+            <a:avLst/>
+          </a:prstGeom>
+          <a:solidFill>
+            <a:srgbClr val="FFFFFF"/>
+          </a:solidFill>
+        </p:spPr>
+      </p:pic>
+      <p:sp>
+        <p:nvSpPr>
+          <p:cNvPr id="276" name="TextBox 275"/>
+          <p:cNvSpPr txBox="1"/>
+          <p:nvPr/>
+        </p:nvSpPr>
+        <p:spPr>
+          <a:xfrm>
+            <a:off x="20537584" y="27740734"/>
+            <a:ext cx="184666" cy="1354217"/>
+          </a:xfrm>
+          <a:prstGeom prst="rect">
+            <a:avLst/>
+          </a:prstGeom>
+          <a:noFill/>
+        </p:spPr>
+        <p:txBody>
+          <a:bodyPr wrap="none" rtlCol="0">
+            <a:spAutoFit/>
+          </a:bodyPr>
+          <a:lstStyle/>
+          <a:p>
+            <a:endParaRPr lang="en-US" dirty="0"/>
+          </a:p>
+        </p:txBody>
+      </p:sp>
+      <p:pic>
+        <p:nvPicPr>
+          <p:cNvPr id="41" name="Picture 40"/>
+          <p:cNvPicPr>
+            <a:picLocks noChangeAspect="1"/>
+          </p:cNvPicPr>
+          <p:nvPr/>
+        </p:nvPicPr>
+        <p:blipFill>
+          <a:blip r:embed="rId18"/>
+          <a:stretch>
+            <a:fillRect/>
+          </a:stretch>
+        </p:blipFill>
+        <p:spPr>
+          <a:xfrm>
+            <a:off x="5489401" y="21051097"/>
+            <a:ext cx="923302" cy="1523449"/>
+          </a:xfrm>
+          <a:prstGeom prst="rect">
+            <a:avLst/>
+          </a:prstGeom>
+          <a:solidFill>
+            <a:srgbClr val="FFFFFF"/>
+          </a:solidFill>
+        </p:spPr>
+      </p:pic>
+      <p:pic>
+        <p:nvPicPr>
+          <p:cNvPr id="43" name="Picture 42"/>
+          <p:cNvPicPr>
+            <a:picLocks noChangeAspect="1"/>
+          </p:cNvPicPr>
+          <p:nvPr/>
+        </p:nvPicPr>
+        <p:blipFill>
+          <a:blip r:embed="rId19"/>
+          <a:stretch>
+            <a:fillRect/>
+          </a:stretch>
+        </p:blipFill>
+        <p:spPr>
+          <a:xfrm>
+            <a:off x="4365578" y="21880744"/>
+            <a:ext cx="521350" cy="1329443"/>
+          </a:xfrm>
+          <a:prstGeom prst="rect">
+            <a:avLst/>
+          </a:prstGeom>
+          <a:solidFill>
+            <a:srgbClr val="FFFFFF"/>
+          </a:solidFill>
+        </p:spPr>
+      </p:pic>
+      <p:pic>
+        <p:nvPicPr>
+          <p:cNvPr id="44" name="Picture 43"/>
+          <p:cNvPicPr>
+            <a:picLocks noChangeAspect="1"/>
+          </p:cNvPicPr>
+          <p:nvPr/>
+        </p:nvPicPr>
+        <p:blipFill>
+          <a:blip r:embed="rId20"/>
+          <a:stretch>
+            <a:fillRect/>
+          </a:stretch>
+        </p:blipFill>
+        <p:spPr>
+          <a:xfrm>
+            <a:off x="3601747" y="23417980"/>
+            <a:ext cx="716489" cy="1504627"/>
+          </a:xfrm>
+          <a:prstGeom prst="rect">
+            <a:avLst/>
+          </a:prstGeom>
+          <a:solidFill>
+            <a:srgbClr val="FFFFFF"/>
+          </a:solidFill>
+        </p:spPr>
+      </p:pic>
+      <p:pic>
+        <p:nvPicPr>
+          <p:cNvPr id="45" name="Picture 44"/>
+          <p:cNvPicPr>
+            <a:picLocks noChangeAspect="1"/>
+          </p:cNvPicPr>
+          <p:nvPr/>
+        </p:nvPicPr>
+        <p:blipFill>
+          <a:blip r:embed="rId21"/>
+          <a:stretch>
+            <a:fillRect/>
+          </a:stretch>
+        </p:blipFill>
+        <p:spPr>
+          <a:xfrm>
+            <a:off x="3398026" y="24986904"/>
+            <a:ext cx="1034444" cy="859529"/>
+          </a:xfrm>
+          <a:prstGeom prst="rect">
+            <a:avLst/>
+          </a:prstGeom>
+          <a:solidFill>
+            <a:srgbClr val="FFFFFF"/>
+          </a:solidFill>
+        </p:spPr>
+      </p:pic>
+      <p:pic>
+        <p:nvPicPr>
+          <p:cNvPr id="47" name="Picture 46"/>
+          <p:cNvPicPr>
+            <a:picLocks noChangeAspect="1"/>
+          </p:cNvPicPr>
+          <p:nvPr/>
+        </p:nvPicPr>
+        <p:blipFill>
+          <a:blip r:embed="rId22"/>
+          <a:stretch>
+            <a:fillRect/>
+          </a:stretch>
+        </p:blipFill>
+        <p:spPr>
+          <a:xfrm rot="3459588">
+            <a:off x="3564639" y="26490449"/>
+            <a:ext cx="1601876" cy="503983"/>
+          </a:xfrm>
+          <a:prstGeom prst="rect">
+            <a:avLst/>
+          </a:prstGeom>
+          <a:solidFill>
+            <a:srgbClr val="FFFFFF"/>
+          </a:solidFill>
+        </p:spPr>
+      </p:pic>
     </p:spTree>
     <p:extLst>
       <p:ext uri="{BB962C8B-B14F-4D97-AF65-F5344CB8AC3E}">

</xml_diff>